<commit_message>
USEI05 - complexity analysis updated
</commit_message>
<xml_diff>
--- a/documentation/sprint1/LAPR3 - Sprint Status Report - Template - EN - Sprint1.pptx
+++ b/documentation/sprint1/LAPR3 - Sprint Status Report - Template - EN - Sprint1.pptx
@@ -297,19 +297,19 @@
                 <c:formatCode>General</c:formatCode>
                 <c:ptCount val="5"/>
                 <c:pt idx="0">
-                  <c:v>21</c:v>
+                  <c:v>10</c:v>
                 </c:pt>
                 <c:pt idx="1">
-                  <c:v>31</c:v>
+                  <c:v>41</c:v>
                 </c:pt>
                 <c:pt idx="2">
-                  <c:v>27</c:v>
+                  <c:v>30</c:v>
                 </c:pt>
                 <c:pt idx="3">
-                  <c:v>44</c:v>
+                  <c:v>50</c:v>
                 </c:pt>
                 <c:pt idx="4">
-                  <c:v>17</c:v>
+                  <c:v>9</c:v>
                 </c:pt>
               </c:numCache>
             </c:numRef>
@@ -1981,7 +1981,7 @@
             <a:fld id="{5D8AA918-AAAF-A948-AD9D-7282A6CA6554}" type="datetimeFigureOut">
               <a:rPr lang="en-US" smtClean="0"/>
               <a:pPr/>
-              <a:t>10/25/2024</a:t>
+              <a:t>10/25/24</a:t>
             </a:fld>
             <a:endParaRPr lang="pt-PT"/>
           </a:p>
@@ -2797,7 +2797,7 @@
             <a:fld id="{44B11A7A-C2E1-40A3-A304-BADFC0305F97}" type="datetimeFigureOut">
               <a:rPr lang="pt-PT" smtClean="0"/>
               <a:pPr/>
-              <a:t>25/10/2024</a:t>
+              <a:t>25/10/24</a:t>
             </a:fld>
             <a:endParaRPr lang="pt-PT"/>
           </a:p>
@@ -2984,7 +2984,7 @@
             <a:fld id="{44B11A7A-C2E1-40A3-A304-BADFC0305F97}" type="datetimeFigureOut">
               <a:rPr lang="pt-PT" smtClean="0"/>
               <a:pPr/>
-              <a:t>25/10/2024</a:t>
+              <a:t>25/10/24</a:t>
             </a:fld>
             <a:endParaRPr lang="pt-PT"/>
           </a:p>
@@ -3461,7 +3461,7 @@
             <a:fld id="{44B11A7A-C2E1-40A3-A304-BADFC0305F97}" type="datetimeFigureOut">
               <a:rPr lang="pt-PT" smtClean="0"/>
               <a:pPr/>
-              <a:t>25/10/2024</a:t>
+              <a:t>25/10/24</a:t>
             </a:fld>
             <a:endParaRPr lang="pt-PT"/>
           </a:p>
@@ -3643,7 +3643,7 @@
             <a:fld id="{44B11A7A-C2E1-40A3-A304-BADFC0305F97}" type="datetimeFigureOut">
               <a:rPr lang="pt-PT" smtClean="0"/>
               <a:pPr/>
-              <a:t>25/10/2024</a:t>
+              <a:t>25/10/24</a:t>
             </a:fld>
             <a:endParaRPr lang="pt-PT"/>
           </a:p>
@@ -11107,10 +11107,10 @@
       </p:sp>
       <p:pic>
         <p:nvPicPr>
-          <p:cNvPr id="1026" name="Picture 2" descr="Uploaded image">
+          <p:cNvPr id="1028" name="Picture 4" descr="Uploaded image">
             <a:extLst>
               <a:ext uri="{FF2B5EF4-FFF2-40B4-BE49-F238E27FC236}">
-                <a16:creationId xmlns:a16="http://schemas.microsoft.com/office/drawing/2014/main" id="{D5376940-4EE0-1A5F-022B-4F9E1214CC36}"/>
+                <a16:creationId xmlns:a16="http://schemas.microsoft.com/office/drawing/2014/main" id="{2069893D-8224-1DB9-6854-093D451396EC}"/>
               </a:ext>
             </a:extLst>
           </p:cNvPr>
@@ -11134,8 +11134,8 @@
         </p:blipFill>
         <p:spPr bwMode="auto">
           <a:xfrm>
-            <a:off x="722530" y="2340349"/>
-            <a:ext cx="3750952" cy="2177301"/>
+            <a:off x="4970400" y="2287256"/>
+            <a:ext cx="3009667" cy="2283485"/>
           </a:xfrm>
           <a:prstGeom prst="rect">
             <a:avLst/>
@@ -11154,15 +11154,15 @@
       </p:pic>
       <p:pic>
         <p:nvPicPr>
-          <p:cNvPr id="1028" name="Picture 4" descr="Uploaded image">
+          <p:cNvPr id="4" name="Imagem 3" descr="Uma imagem com texto, captura de ecrã, Tipo de letra, número&#10;&#10;Descrição gerada automaticamente">
             <a:extLst>
               <a:ext uri="{FF2B5EF4-FFF2-40B4-BE49-F238E27FC236}">
-                <a16:creationId xmlns:a16="http://schemas.microsoft.com/office/drawing/2014/main" id="{2069893D-8224-1DB9-6854-093D451396EC}"/>
+                <a16:creationId xmlns:a16="http://schemas.microsoft.com/office/drawing/2014/main" id="{7B0AF192-C6CC-B65E-6E9C-18BFFCEAB9D8}"/>
               </a:ext>
             </a:extLst>
           </p:cNvPr>
           <p:cNvPicPr>
-            <a:picLocks noChangeAspect="1" noChangeArrowheads="1"/>
+            <a:picLocks noChangeAspect="1"/>
           </p:cNvPicPr>
           <p:nvPr/>
         </p:nvPicPr>
@@ -11174,29 +11174,54 @@
               </a:ext>
             </a:extLst>
           </a:blip>
-          <a:srcRect/>
           <a:stretch>
             <a:fillRect/>
           </a:stretch>
         </p:blipFill>
-        <p:spPr bwMode="auto">
+        <p:spPr>
           <a:xfrm>
-            <a:off x="4970400" y="2287256"/>
-            <a:ext cx="3009667" cy="2283485"/>
+            <a:off x="1019574" y="2452785"/>
+            <a:ext cx="3944525" cy="2133067"/>
           </a:xfrm>
           <a:prstGeom prst="rect">
             <a:avLst/>
           </a:prstGeom>
-          <a:noFill/>
-          <a:extLst>
-            <a:ext uri="{909E8E84-426E-40DD-AFC4-6F175D3DCCD1}">
-              <a14:hiddenFill xmlns:a14="http://schemas.microsoft.com/office/drawing/2010/main">
-                <a:solidFill>
-                  <a:srgbClr val="FFFFFF"/>
-                </a:solidFill>
-              </a14:hiddenFill>
-            </a:ext>
-          </a:extLst>
+        </p:spPr>
+      </p:pic>
+      <p:pic>
+        <p:nvPicPr>
+          <p:cNvPr id="7" name="Imagem 6" descr="Uma imagem com Tipo de letra, texto, tipografia, Gráficos&#10;&#10;Descrição gerada automaticamente">
+            <a:extLst>
+              <a:ext uri="{FF2B5EF4-FFF2-40B4-BE49-F238E27FC236}">
+                <a16:creationId xmlns:a16="http://schemas.microsoft.com/office/drawing/2014/main" id="{D48B3EB7-5911-02ED-8A63-E42510D45B5E}"/>
+              </a:ext>
+            </a:extLst>
+          </p:cNvPr>
+          <p:cNvPicPr>
+            <a:picLocks noChangeAspect="1"/>
+          </p:cNvPicPr>
+          <p:nvPr/>
+        </p:nvPicPr>
+        <p:blipFill>
+          <a:blip r:embed="rId4">
+            <a:extLst>
+              <a:ext uri="{28A0092B-C50C-407E-A947-70E740481C1C}">
+                <a14:useLocalDpi xmlns:a14="http://schemas.microsoft.com/office/drawing/2010/main" val="0"/>
+              </a:ext>
+            </a:extLst>
+          </a:blip>
+          <a:stretch>
+            <a:fillRect/>
+          </a:stretch>
+        </p:blipFill>
+        <p:spPr>
+          <a:xfrm>
+            <a:off x="947555" y="2256146"/>
+            <a:ext cx="1833768" cy="196639"/>
+          </a:xfrm>
+          <a:prstGeom prst="rect">
+            <a:avLst/>
+          </a:prstGeom>
         </p:spPr>
       </p:pic>
     </p:spTree>
@@ -11569,7 +11594,7 @@
                   <a:schemeClr val="tx1"/>
                 </a:solidFill>
               </a:rPr>
-              <a:t>“Jorge has the highest contribution, with nearly 45 hours/tasks completed. This indicates that Jorge is currently leading in productivity, possibly carrying a larger workload. </a:t>
+              <a:t>“Jorge has the highest contribution, with about 50 hours completed. This indicates that Jorge is currently leading in productivity, possibly carrying a larger workload. </a:t>
             </a:r>
           </a:p>
           <a:p>
@@ -11580,7 +11605,7 @@
                   <a:schemeClr val="tx1"/>
                 </a:solidFill>
               </a:rPr>
-              <a:t>Francisco is the second most productive, contributing around 30 hours/tasks.</a:t>
+              <a:t>Francisco is the second most productive, contributing around 41 hours.</a:t>
             </a:r>
           </a:p>
           <a:p>
@@ -11634,7 +11659,7 @@
                   <a:schemeClr val="tx1"/>
                 </a:solidFill>
               </a:rPr>
-              <a:t>slightly</a:t>
+              <a:t>lower</a:t>
             </a:r>
             <a:r>
               <a:rPr lang="pt-PT" altLang="pt-PT" sz="1400" b="0" dirty="0">
@@ -11650,7 +11675,7 @@
                   <a:schemeClr val="tx1"/>
                 </a:solidFill>
               </a:rPr>
-              <a:t>lower</a:t>
+              <a:t>contribution</a:t>
             </a:r>
             <a:r>
               <a:rPr lang="pt-PT" altLang="pt-PT" sz="1400" b="0" dirty="0">
@@ -11658,6 +11683,22 @@
                   <a:schemeClr val="tx1"/>
                 </a:solidFill>
               </a:rPr>
+              <a:t>, </a:t>
+            </a:r>
+            <a:r>
+              <a:rPr lang="pt-PT" altLang="pt-PT" sz="1400" b="0" dirty="0" err="1">
+                <a:solidFill>
+                  <a:schemeClr val="tx1"/>
+                </a:solidFill>
+              </a:rPr>
+              <a:t>likely</a:t>
+            </a:r>
+            <a:r>
+              <a:rPr lang="pt-PT" altLang="pt-PT" sz="1400" b="0" dirty="0">
+                <a:solidFill>
+                  <a:schemeClr val="tx1"/>
+                </a:solidFill>
+              </a:rPr>
               <a:t> </a:t>
             </a:r>
             <a:r>
@@ -11666,7 +11707,7 @@
                   <a:schemeClr val="tx1"/>
                 </a:solidFill>
               </a:rPr>
-              <a:t>contribution</a:t>
+              <a:t>around</a:t>
             </a:r>
             <a:r>
               <a:rPr lang="pt-PT" altLang="pt-PT" sz="1400" b="0" dirty="0">
@@ -11674,7 +11715,7 @@
                   <a:schemeClr val="tx1"/>
                 </a:solidFill>
               </a:rPr>
-              <a:t>, </a:t>
+              <a:t> 30 </a:t>
             </a:r>
             <a:r>
               <a:rPr lang="pt-PT" altLang="pt-PT" sz="1400" b="0" dirty="0" err="1">
@@ -11682,55 +11723,7 @@
                   <a:schemeClr val="tx1"/>
                 </a:solidFill>
               </a:rPr>
-              <a:t>likely</a:t>
-            </a:r>
-            <a:r>
-              <a:rPr lang="pt-PT" altLang="pt-PT" sz="1400" b="0" dirty="0">
-                <a:solidFill>
-                  <a:schemeClr val="tx1"/>
-                </a:solidFill>
-              </a:rPr>
-              <a:t> </a:t>
-            </a:r>
-            <a:r>
-              <a:rPr lang="pt-PT" altLang="pt-PT" sz="1400" b="0" dirty="0" err="1">
-                <a:solidFill>
-                  <a:schemeClr val="tx1"/>
-                </a:solidFill>
-              </a:rPr>
-              <a:t>around</a:t>
-            </a:r>
-            <a:r>
-              <a:rPr lang="pt-PT" altLang="pt-PT" sz="1400" b="0" dirty="0">
-                <a:solidFill>
-                  <a:schemeClr val="tx1"/>
-                </a:solidFill>
-              </a:rPr>
-              <a:t> 25 </a:t>
-            </a:r>
-            <a:r>
-              <a:rPr lang="pt-PT" altLang="pt-PT" sz="1400" b="0" dirty="0" err="1">
-                <a:solidFill>
-                  <a:schemeClr val="tx1"/>
-                </a:solidFill>
-              </a:rPr>
               <a:t>hours</a:t>
-            </a:r>
-            <a:r>
-              <a:rPr lang="pt-PT" altLang="pt-PT" sz="1400" b="0" dirty="0">
-                <a:solidFill>
-                  <a:schemeClr val="tx1"/>
-                </a:solidFill>
-              </a:rPr>
-              <a:t>/</a:t>
-            </a:r>
-            <a:r>
-              <a:rPr lang="pt-PT" altLang="pt-PT" sz="1400" b="0" dirty="0" err="1">
-                <a:solidFill>
-                  <a:schemeClr val="tx1"/>
-                </a:solidFill>
-              </a:rPr>
-              <a:t>tasks</a:t>
             </a:r>
             <a:r>
               <a:rPr lang="pt-PT" altLang="pt-PT" sz="1400" b="0" dirty="0">
@@ -11856,7 +11849,7 @@
                   <a:schemeClr val="tx1"/>
                 </a:solidFill>
               </a:rPr>
-              <a:t>slightly</a:t>
+              <a:t>with</a:t>
             </a:r>
             <a:r>
               <a:rPr lang="pt-PT" altLang="pt-PT" sz="1400" b="0" dirty="0">
@@ -11864,7 +11857,7 @@
                   <a:schemeClr val="tx1"/>
                 </a:solidFill>
               </a:rPr>
-              <a:t> </a:t>
+              <a:t> 10 </a:t>
             </a:r>
             <a:r>
               <a:rPr lang="pt-PT" altLang="pt-PT" sz="1400" b="0" dirty="0" err="1">
@@ -11872,7 +11865,7 @@
                   <a:schemeClr val="tx1"/>
                 </a:solidFill>
               </a:rPr>
-              <a:t>above</a:t>
+              <a:t>and</a:t>
             </a:r>
             <a:r>
               <a:rPr lang="pt-PT" altLang="pt-PT" sz="1400" b="0" dirty="0">
@@ -11880,7 +11873,7 @@
                   <a:schemeClr val="tx1"/>
                 </a:solidFill>
               </a:rPr>
-              <a:t> 20 </a:t>
+              <a:t> Paulo </a:t>
             </a:r>
             <a:r>
               <a:rPr lang="pt-PT" altLang="pt-PT" sz="1400" b="0" dirty="0" err="1">
@@ -11888,7 +11881,7 @@
                   <a:schemeClr val="tx1"/>
                 </a:solidFill>
               </a:rPr>
-              <a:t>and</a:t>
+              <a:t>below</a:t>
             </a:r>
             <a:r>
               <a:rPr lang="pt-PT" altLang="pt-PT" sz="1400" b="0" dirty="0">
@@ -11896,23 +11889,7 @@
                   <a:schemeClr val="tx1"/>
                 </a:solidFill>
               </a:rPr>
-              <a:t> Paulo </a:t>
-            </a:r>
-            <a:r>
-              <a:rPr lang="pt-PT" altLang="pt-PT" sz="1400" b="0" dirty="0" err="1">
-                <a:solidFill>
-                  <a:schemeClr val="tx1"/>
-                </a:solidFill>
-              </a:rPr>
-              <a:t>below</a:t>
-            </a:r>
-            <a:r>
-              <a:rPr lang="pt-PT" altLang="pt-PT" sz="1400" b="0" dirty="0">
-                <a:solidFill>
-                  <a:schemeClr val="tx1"/>
-                </a:solidFill>
-              </a:rPr>
-              <a:t> 20. “</a:t>
+              <a:t> 10. “</a:t>
             </a:r>
           </a:p>
           <a:p>
@@ -11944,26 +11921,1785 @@
             </a:endParaRPr>
           </a:p>
           <a:p>
-            <a:pPr algn="just"/>
-            <a:r>
-              <a:rPr lang="en-US" sz="1400" b="0" dirty="0">
-                <a:solidFill>
-                  <a:schemeClr val="tx1"/>
-                </a:solidFill>
-              </a:rPr>
-              <a:t>Looking at the overall work distribution, it’s clear that Jorge has taken on a significant portion of the tasks or hours, which shows dedication, but it also suggests that there might be an imbalance. Francisco and Emanuel are putting in solid contributions, but they could maybe step it up a bit to lighten Jorge’s load. Meanwhile, Romeu and Paulo are doing their part, but seem to be trailing behind the rest of the team a little bit.</a:t>
+            <a:r>
+              <a:rPr lang="pt-PT" sz="1400" b="0" dirty="0" err="1">
+                <a:solidFill>
+                  <a:srgbClr val="0E0E0E"/>
+                </a:solidFill>
+                <a:effectLst/>
+                <a:latin typeface=".SF NS"/>
+              </a:rPr>
+              <a:t>The</a:t>
+            </a:r>
+            <a:r>
+              <a:rPr lang="pt-PT" sz="1400" b="0" dirty="0">
+                <a:solidFill>
+                  <a:srgbClr val="0E0E0E"/>
+                </a:solidFill>
+                <a:effectLst/>
+                <a:latin typeface=".SF NS"/>
+              </a:rPr>
+              <a:t> data </a:t>
+            </a:r>
+            <a:r>
+              <a:rPr lang="pt-PT" sz="1400" b="0" dirty="0" err="1">
+                <a:solidFill>
+                  <a:srgbClr val="0E0E0E"/>
+                </a:solidFill>
+                <a:effectLst/>
+                <a:latin typeface=".SF NS"/>
+              </a:rPr>
+              <a:t>reflects</a:t>
+            </a:r>
+            <a:r>
+              <a:rPr lang="pt-PT" sz="1400" b="0" dirty="0">
+                <a:solidFill>
+                  <a:srgbClr val="0E0E0E"/>
+                </a:solidFill>
+                <a:effectLst/>
+                <a:latin typeface=".SF NS"/>
+              </a:rPr>
+              <a:t> a </a:t>
+            </a:r>
+            <a:r>
+              <a:rPr lang="pt-PT" sz="1400" b="0" dirty="0" err="1">
+                <a:solidFill>
+                  <a:srgbClr val="0E0E0E"/>
+                </a:solidFill>
+                <a:effectLst/>
+                <a:latin typeface=".SF NS"/>
+              </a:rPr>
+              <a:t>diverse</a:t>
+            </a:r>
+            <a:r>
+              <a:rPr lang="pt-PT" sz="1400" b="0" dirty="0">
+                <a:solidFill>
+                  <a:srgbClr val="0E0E0E"/>
+                </a:solidFill>
+                <a:effectLst/>
+                <a:latin typeface=".SF NS"/>
+              </a:rPr>
+              <a:t> range </a:t>
+            </a:r>
+            <a:r>
+              <a:rPr lang="pt-PT" sz="1400" b="0" dirty="0" err="1">
+                <a:solidFill>
+                  <a:srgbClr val="0E0E0E"/>
+                </a:solidFill>
+                <a:effectLst/>
+                <a:latin typeface=".SF NS"/>
+              </a:rPr>
+              <a:t>of</a:t>
+            </a:r>
+            <a:r>
+              <a:rPr lang="pt-PT" sz="1400" b="0" dirty="0">
+                <a:solidFill>
+                  <a:srgbClr val="0E0E0E"/>
+                </a:solidFill>
+                <a:effectLst/>
+                <a:latin typeface=".SF NS"/>
+              </a:rPr>
+              <a:t> </a:t>
+            </a:r>
+            <a:r>
+              <a:rPr lang="pt-PT" sz="1400" b="0" dirty="0" err="1">
+                <a:solidFill>
+                  <a:srgbClr val="0E0E0E"/>
+                </a:solidFill>
+                <a:effectLst/>
+                <a:latin typeface=".SF NS"/>
+              </a:rPr>
+              <a:t>contributions</a:t>
+            </a:r>
+            <a:r>
+              <a:rPr lang="pt-PT" sz="1400" b="0" dirty="0">
+                <a:solidFill>
+                  <a:srgbClr val="0E0E0E"/>
+                </a:solidFill>
+                <a:effectLst/>
+                <a:latin typeface=".SF NS"/>
+              </a:rPr>
+              <a:t> </a:t>
+            </a:r>
+            <a:r>
+              <a:rPr lang="pt-PT" sz="1400" b="0" dirty="0" err="1">
+                <a:solidFill>
+                  <a:srgbClr val="0E0E0E"/>
+                </a:solidFill>
+                <a:effectLst/>
+                <a:latin typeface=".SF NS"/>
+              </a:rPr>
+              <a:t>among</a:t>
+            </a:r>
+            <a:r>
+              <a:rPr lang="pt-PT" sz="1400" b="0" dirty="0">
+                <a:solidFill>
+                  <a:srgbClr val="0E0E0E"/>
+                </a:solidFill>
+                <a:effectLst/>
+                <a:latin typeface=".SF NS"/>
+              </a:rPr>
+              <a:t> </a:t>
+            </a:r>
+            <a:r>
+              <a:rPr lang="pt-PT" sz="1400" b="0" dirty="0" err="1">
+                <a:solidFill>
+                  <a:srgbClr val="0E0E0E"/>
+                </a:solidFill>
+                <a:effectLst/>
+                <a:latin typeface=".SF NS"/>
+              </a:rPr>
+              <a:t>the</a:t>
+            </a:r>
+            <a:r>
+              <a:rPr lang="pt-PT" sz="1400" b="0" dirty="0">
+                <a:solidFill>
+                  <a:srgbClr val="0E0E0E"/>
+                </a:solidFill>
+                <a:effectLst/>
+                <a:latin typeface=".SF NS"/>
+              </a:rPr>
+              <a:t> team </a:t>
+            </a:r>
+            <a:r>
+              <a:rPr lang="pt-PT" sz="1400" b="0" dirty="0" err="1">
+                <a:solidFill>
+                  <a:srgbClr val="0E0E0E"/>
+                </a:solidFill>
+                <a:effectLst/>
+                <a:latin typeface=".SF NS"/>
+              </a:rPr>
+              <a:t>members</a:t>
+            </a:r>
+            <a:r>
+              <a:rPr lang="pt-PT" sz="1400" b="0" dirty="0">
+                <a:solidFill>
+                  <a:srgbClr val="0E0E0E"/>
+                </a:solidFill>
+                <a:effectLst/>
+                <a:latin typeface=".SF NS"/>
+              </a:rPr>
+              <a:t>, </a:t>
+            </a:r>
+            <a:r>
+              <a:rPr lang="pt-PT" sz="1400" b="0" dirty="0" err="1">
+                <a:solidFill>
+                  <a:srgbClr val="0E0E0E"/>
+                </a:solidFill>
+                <a:effectLst/>
+                <a:latin typeface=".SF NS"/>
+              </a:rPr>
+              <a:t>highlighting</a:t>
+            </a:r>
+            <a:r>
+              <a:rPr lang="pt-PT" sz="1400" b="0" dirty="0">
+                <a:solidFill>
+                  <a:srgbClr val="0E0E0E"/>
+                </a:solidFill>
+                <a:effectLst/>
+                <a:latin typeface=".SF NS"/>
+              </a:rPr>
+              <a:t> </a:t>
+            </a:r>
+            <a:r>
+              <a:rPr lang="pt-PT" sz="1400" b="0" dirty="0" err="1">
+                <a:solidFill>
+                  <a:srgbClr val="0E0E0E"/>
+                </a:solidFill>
+                <a:effectLst/>
+                <a:latin typeface=".SF NS"/>
+              </a:rPr>
+              <a:t>both</a:t>
+            </a:r>
+            <a:r>
+              <a:rPr lang="pt-PT" sz="1400" b="0" dirty="0">
+                <a:solidFill>
+                  <a:srgbClr val="0E0E0E"/>
+                </a:solidFill>
+                <a:effectLst/>
+                <a:latin typeface=".SF NS"/>
+              </a:rPr>
+              <a:t> </a:t>
+            </a:r>
+            <a:r>
+              <a:rPr lang="pt-PT" sz="1400" b="0" dirty="0" err="1">
+                <a:solidFill>
+                  <a:srgbClr val="0E0E0E"/>
+                </a:solidFill>
+                <a:effectLst/>
+                <a:latin typeface=".SF NS"/>
+              </a:rPr>
+              <a:t>strengths</a:t>
+            </a:r>
+            <a:r>
+              <a:rPr lang="pt-PT" sz="1400" b="0" dirty="0">
+                <a:solidFill>
+                  <a:srgbClr val="0E0E0E"/>
+                </a:solidFill>
+                <a:effectLst/>
+                <a:latin typeface=".SF NS"/>
+              </a:rPr>
+              <a:t> </a:t>
+            </a:r>
+            <a:r>
+              <a:rPr lang="pt-PT" sz="1400" b="0" dirty="0" err="1">
+                <a:solidFill>
+                  <a:srgbClr val="0E0E0E"/>
+                </a:solidFill>
+                <a:effectLst/>
+                <a:latin typeface=".SF NS"/>
+              </a:rPr>
+              <a:t>and</a:t>
+            </a:r>
+            <a:r>
+              <a:rPr lang="pt-PT" sz="1400" b="0" dirty="0">
+                <a:solidFill>
+                  <a:srgbClr val="0E0E0E"/>
+                </a:solidFill>
+                <a:effectLst/>
+                <a:latin typeface=".SF NS"/>
+              </a:rPr>
+              <a:t> </a:t>
+            </a:r>
+            <a:r>
+              <a:rPr lang="pt-PT" sz="1400" b="0" dirty="0" err="1">
+                <a:solidFill>
+                  <a:srgbClr val="0E0E0E"/>
+                </a:solidFill>
+                <a:effectLst/>
+                <a:latin typeface=".SF NS"/>
+              </a:rPr>
+              <a:t>areas</a:t>
+            </a:r>
+            <a:r>
+              <a:rPr lang="pt-PT" sz="1400" b="0" dirty="0">
+                <a:solidFill>
+                  <a:srgbClr val="0E0E0E"/>
+                </a:solidFill>
+                <a:effectLst/>
+                <a:latin typeface=".SF NS"/>
+              </a:rPr>
+              <a:t> for </a:t>
+            </a:r>
+            <a:r>
+              <a:rPr lang="pt-PT" sz="1400" b="0" dirty="0" err="1">
+                <a:solidFill>
+                  <a:srgbClr val="0E0E0E"/>
+                </a:solidFill>
+                <a:effectLst/>
+                <a:latin typeface=".SF NS"/>
+              </a:rPr>
+              <a:t>potential</a:t>
+            </a:r>
+            <a:r>
+              <a:rPr lang="pt-PT" sz="1400" b="0" dirty="0">
+                <a:solidFill>
+                  <a:srgbClr val="0E0E0E"/>
+                </a:solidFill>
+                <a:effectLst/>
+                <a:latin typeface=".SF NS"/>
+              </a:rPr>
+              <a:t> </a:t>
+            </a:r>
+            <a:r>
+              <a:rPr lang="pt-PT" sz="1400" b="0" dirty="0" err="1">
+                <a:solidFill>
+                  <a:srgbClr val="0E0E0E"/>
+                </a:solidFill>
+                <a:effectLst/>
+                <a:latin typeface=".SF NS"/>
+              </a:rPr>
+              <a:t>growth</a:t>
+            </a:r>
+            <a:r>
+              <a:rPr lang="pt-PT" sz="1400" b="0" dirty="0">
+                <a:solidFill>
+                  <a:srgbClr val="0E0E0E"/>
+                </a:solidFill>
+                <a:effectLst/>
+                <a:latin typeface=".SF NS"/>
+              </a:rPr>
+              <a:t>. Jorge leads </a:t>
+            </a:r>
+            <a:r>
+              <a:rPr lang="pt-PT" sz="1400" b="0" dirty="0" err="1">
+                <a:solidFill>
+                  <a:srgbClr val="0E0E0E"/>
+                </a:solidFill>
+                <a:effectLst/>
+                <a:latin typeface=".SF NS"/>
+              </a:rPr>
+              <a:t>with</a:t>
+            </a:r>
+            <a:r>
+              <a:rPr lang="pt-PT" sz="1400" b="0" dirty="0">
+                <a:solidFill>
+                  <a:srgbClr val="0E0E0E"/>
+                </a:solidFill>
+                <a:effectLst/>
+                <a:latin typeface=".SF NS"/>
+              </a:rPr>
+              <a:t> </a:t>
+            </a:r>
+            <a:r>
+              <a:rPr lang="pt-PT" sz="1400" b="0" dirty="0" err="1">
+                <a:solidFill>
+                  <a:srgbClr val="0E0E0E"/>
+                </a:solidFill>
+                <a:effectLst/>
+                <a:latin typeface=".SF NS"/>
+              </a:rPr>
+              <a:t>an</a:t>
+            </a:r>
+            <a:r>
+              <a:rPr lang="pt-PT" sz="1400" b="0" dirty="0">
+                <a:solidFill>
+                  <a:srgbClr val="0E0E0E"/>
+                </a:solidFill>
+                <a:effectLst/>
+                <a:latin typeface=".SF NS"/>
+              </a:rPr>
+              <a:t> </a:t>
+            </a:r>
+            <a:r>
+              <a:rPr lang="pt-PT" sz="1400" b="0" dirty="0" err="1">
+                <a:solidFill>
+                  <a:srgbClr val="0E0E0E"/>
+                </a:solidFill>
+                <a:effectLst/>
+                <a:latin typeface=".SF NS"/>
+              </a:rPr>
+              <a:t>impressive</a:t>
+            </a:r>
+            <a:r>
+              <a:rPr lang="pt-PT" sz="1400" b="0" dirty="0">
+                <a:solidFill>
+                  <a:srgbClr val="0E0E0E"/>
+                </a:solidFill>
+                <a:effectLst/>
+                <a:latin typeface=".SF NS"/>
+              </a:rPr>
+              <a:t> </a:t>
+            </a:r>
+            <a:r>
+              <a:rPr lang="pt-PT" sz="1400" b="0" dirty="0" err="1">
+                <a:solidFill>
+                  <a:srgbClr val="0E0E0E"/>
+                </a:solidFill>
+                <a:effectLst/>
+                <a:latin typeface=".SF NS"/>
+              </a:rPr>
+              <a:t>contribution</a:t>
+            </a:r>
+            <a:r>
+              <a:rPr lang="pt-PT" sz="1400" b="0" dirty="0">
+                <a:solidFill>
+                  <a:srgbClr val="0E0E0E"/>
+                </a:solidFill>
+                <a:effectLst/>
+                <a:latin typeface=".SF NS"/>
+              </a:rPr>
+              <a:t> </a:t>
+            </a:r>
+            <a:r>
+              <a:rPr lang="pt-PT" sz="1400" b="0" dirty="0" err="1">
+                <a:solidFill>
+                  <a:srgbClr val="0E0E0E"/>
+                </a:solidFill>
+                <a:effectLst/>
+                <a:latin typeface=".SF NS"/>
+              </a:rPr>
+              <a:t>of</a:t>
+            </a:r>
+            <a:r>
+              <a:rPr lang="pt-PT" sz="1400" b="0" dirty="0">
+                <a:solidFill>
+                  <a:srgbClr val="0E0E0E"/>
+                </a:solidFill>
+                <a:effectLst/>
+                <a:latin typeface=".SF NS"/>
+              </a:rPr>
+              <a:t> </a:t>
+            </a:r>
+            <a:r>
+              <a:rPr lang="pt-PT" sz="1400" b="0" dirty="0" err="1">
+                <a:solidFill>
+                  <a:srgbClr val="0E0E0E"/>
+                </a:solidFill>
+                <a:effectLst/>
+                <a:latin typeface=".SF NS"/>
+              </a:rPr>
+              <a:t>around</a:t>
+            </a:r>
+            <a:r>
+              <a:rPr lang="pt-PT" sz="1400" b="0" dirty="0">
+                <a:solidFill>
+                  <a:srgbClr val="0E0E0E"/>
+                </a:solidFill>
+                <a:effectLst/>
+                <a:latin typeface=".SF NS"/>
+              </a:rPr>
+              <a:t> 50 </a:t>
+            </a:r>
+            <a:r>
+              <a:rPr lang="pt-PT" sz="1400" b="0" dirty="0" err="1">
+                <a:solidFill>
+                  <a:srgbClr val="0E0E0E"/>
+                </a:solidFill>
+                <a:effectLst/>
+                <a:latin typeface=".SF NS"/>
+              </a:rPr>
+              <a:t>hours</a:t>
+            </a:r>
+            <a:r>
+              <a:rPr lang="pt-PT" sz="1400" b="0" dirty="0">
+                <a:solidFill>
+                  <a:srgbClr val="0E0E0E"/>
+                </a:solidFill>
+                <a:effectLst/>
+                <a:latin typeface=".SF NS"/>
+              </a:rPr>
+              <a:t>, </a:t>
+            </a:r>
+            <a:r>
+              <a:rPr lang="pt-PT" sz="1400" b="0" dirty="0" err="1">
+                <a:solidFill>
+                  <a:srgbClr val="0E0E0E"/>
+                </a:solidFill>
+                <a:effectLst/>
+                <a:latin typeface=".SF NS"/>
+              </a:rPr>
+              <a:t>showcasing</a:t>
+            </a:r>
+            <a:r>
+              <a:rPr lang="pt-PT" sz="1400" b="0" dirty="0">
+                <a:solidFill>
+                  <a:srgbClr val="0E0E0E"/>
+                </a:solidFill>
+                <a:effectLst/>
+                <a:latin typeface=".SF NS"/>
+              </a:rPr>
+              <a:t> </a:t>
+            </a:r>
+            <a:r>
+              <a:rPr lang="pt-PT" sz="1400" b="0" dirty="0" err="1">
+                <a:solidFill>
+                  <a:srgbClr val="0E0E0E"/>
+                </a:solidFill>
+                <a:effectLst/>
+                <a:latin typeface=".SF NS"/>
+              </a:rPr>
+              <a:t>his</a:t>
+            </a:r>
+            <a:r>
+              <a:rPr lang="pt-PT" sz="1400" b="0" dirty="0">
+                <a:solidFill>
+                  <a:srgbClr val="0E0E0E"/>
+                </a:solidFill>
+                <a:effectLst/>
+                <a:latin typeface=".SF NS"/>
+              </a:rPr>
+              <a:t> </a:t>
+            </a:r>
+            <a:r>
+              <a:rPr lang="pt-PT" sz="1400" b="0" dirty="0" err="1">
+                <a:solidFill>
+                  <a:srgbClr val="0E0E0E"/>
+                </a:solidFill>
+                <a:effectLst/>
+                <a:latin typeface=".SF NS"/>
+              </a:rPr>
+              <a:t>strong</a:t>
+            </a:r>
+            <a:r>
+              <a:rPr lang="pt-PT" sz="1400" b="0" dirty="0">
+                <a:solidFill>
+                  <a:srgbClr val="0E0E0E"/>
+                </a:solidFill>
+                <a:effectLst/>
+                <a:latin typeface=".SF NS"/>
+              </a:rPr>
+              <a:t> </a:t>
+            </a:r>
+            <a:r>
+              <a:rPr lang="pt-PT" sz="1400" b="0" dirty="0" err="1">
+                <a:solidFill>
+                  <a:srgbClr val="0E0E0E"/>
+                </a:solidFill>
+                <a:effectLst/>
+                <a:latin typeface=".SF NS"/>
+              </a:rPr>
+              <a:t>commitment</a:t>
+            </a:r>
+            <a:r>
+              <a:rPr lang="pt-PT" sz="1400" b="0" dirty="0">
+                <a:solidFill>
+                  <a:srgbClr val="0E0E0E"/>
+                </a:solidFill>
+                <a:effectLst/>
+                <a:latin typeface=".SF NS"/>
+              </a:rPr>
+              <a:t> </a:t>
+            </a:r>
+            <a:r>
+              <a:rPr lang="pt-PT" sz="1400" b="0" dirty="0" err="1">
+                <a:solidFill>
+                  <a:srgbClr val="0E0E0E"/>
+                </a:solidFill>
+                <a:effectLst/>
+                <a:latin typeface=".SF NS"/>
+              </a:rPr>
+              <a:t>and</a:t>
+            </a:r>
+            <a:r>
+              <a:rPr lang="pt-PT" sz="1400" b="0" dirty="0">
+                <a:solidFill>
+                  <a:srgbClr val="0E0E0E"/>
+                </a:solidFill>
+                <a:effectLst/>
+                <a:latin typeface=".SF NS"/>
+              </a:rPr>
+              <a:t> </a:t>
+            </a:r>
+            <a:r>
+              <a:rPr lang="pt-PT" sz="1400" b="0" dirty="0" err="1">
+                <a:solidFill>
+                  <a:srgbClr val="0E0E0E"/>
+                </a:solidFill>
+                <a:effectLst/>
+                <a:latin typeface=".SF NS"/>
+              </a:rPr>
+              <a:t>productivity</a:t>
+            </a:r>
+            <a:r>
+              <a:rPr lang="pt-PT" sz="1400" b="0" dirty="0">
+                <a:solidFill>
+                  <a:srgbClr val="0E0E0E"/>
+                </a:solidFill>
+                <a:effectLst/>
+                <a:latin typeface=".SF NS"/>
+              </a:rPr>
+              <a:t>. </a:t>
+            </a:r>
+            <a:r>
+              <a:rPr lang="pt-PT" sz="1400" b="0" dirty="0" err="1">
+                <a:solidFill>
+                  <a:srgbClr val="0E0E0E"/>
+                </a:solidFill>
+                <a:effectLst/>
+                <a:latin typeface=".SF NS"/>
+              </a:rPr>
+              <a:t>This</a:t>
+            </a:r>
+            <a:r>
+              <a:rPr lang="pt-PT" sz="1400" b="0" dirty="0">
+                <a:solidFill>
+                  <a:srgbClr val="0E0E0E"/>
+                </a:solidFill>
+                <a:effectLst/>
+                <a:latin typeface=".SF NS"/>
+              </a:rPr>
+              <a:t> </a:t>
+            </a:r>
+            <a:r>
+              <a:rPr lang="pt-PT" sz="1400" b="0" dirty="0" err="1">
+                <a:solidFill>
+                  <a:srgbClr val="0E0E0E"/>
+                </a:solidFill>
+                <a:effectLst/>
+                <a:latin typeface=".SF NS"/>
+              </a:rPr>
+              <a:t>level</a:t>
+            </a:r>
+            <a:r>
+              <a:rPr lang="pt-PT" sz="1400" b="0" dirty="0">
+                <a:solidFill>
+                  <a:srgbClr val="0E0E0E"/>
+                </a:solidFill>
+                <a:effectLst/>
+                <a:latin typeface=".SF NS"/>
+              </a:rPr>
+              <a:t> </a:t>
+            </a:r>
+            <a:r>
+              <a:rPr lang="pt-PT" sz="1400" b="0" dirty="0" err="1">
+                <a:solidFill>
+                  <a:srgbClr val="0E0E0E"/>
+                </a:solidFill>
+                <a:effectLst/>
+                <a:latin typeface=".SF NS"/>
+              </a:rPr>
+              <a:t>of</a:t>
+            </a:r>
+            <a:r>
+              <a:rPr lang="pt-PT" sz="1400" b="0" dirty="0">
+                <a:solidFill>
+                  <a:srgbClr val="0E0E0E"/>
+                </a:solidFill>
+                <a:effectLst/>
+                <a:latin typeface=".SF NS"/>
+              </a:rPr>
+              <a:t> </a:t>
+            </a:r>
+            <a:r>
+              <a:rPr lang="pt-PT" sz="1400" b="0" dirty="0" err="1">
+                <a:solidFill>
+                  <a:srgbClr val="0E0E0E"/>
+                </a:solidFill>
+                <a:effectLst/>
+                <a:latin typeface=".SF NS"/>
+              </a:rPr>
+              <a:t>engagement</a:t>
+            </a:r>
+            <a:r>
+              <a:rPr lang="pt-PT" sz="1400" b="0" dirty="0">
+                <a:solidFill>
+                  <a:srgbClr val="0E0E0E"/>
+                </a:solidFill>
+                <a:effectLst/>
+                <a:latin typeface=".SF NS"/>
+              </a:rPr>
+              <a:t> </a:t>
+            </a:r>
+            <a:r>
+              <a:rPr lang="pt-PT" sz="1400" b="0" dirty="0" err="1">
+                <a:solidFill>
+                  <a:srgbClr val="0E0E0E"/>
+                </a:solidFill>
+                <a:effectLst/>
+                <a:latin typeface=".SF NS"/>
+              </a:rPr>
+              <a:t>is</a:t>
+            </a:r>
+            <a:r>
+              <a:rPr lang="pt-PT" sz="1400" b="0" dirty="0">
+                <a:solidFill>
+                  <a:srgbClr val="0E0E0E"/>
+                </a:solidFill>
+                <a:effectLst/>
+                <a:latin typeface=".SF NS"/>
+              </a:rPr>
+              <a:t> </a:t>
+            </a:r>
+            <a:r>
+              <a:rPr lang="pt-PT" sz="1400" b="0" dirty="0" err="1">
+                <a:solidFill>
+                  <a:srgbClr val="0E0E0E"/>
+                </a:solidFill>
+                <a:effectLst/>
+                <a:latin typeface=".SF NS"/>
+              </a:rPr>
+              <a:t>commendable</a:t>
+            </a:r>
+            <a:r>
+              <a:rPr lang="pt-PT" sz="1400" b="0" dirty="0">
+                <a:solidFill>
+                  <a:srgbClr val="0E0E0E"/>
+                </a:solidFill>
+                <a:effectLst/>
+                <a:latin typeface=".SF NS"/>
+              </a:rPr>
+              <a:t>, </a:t>
+            </a:r>
+            <a:r>
+              <a:rPr lang="pt-PT" sz="1400" b="0" dirty="0" err="1">
+                <a:solidFill>
+                  <a:srgbClr val="0E0E0E"/>
+                </a:solidFill>
+                <a:effectLst/>
+                <a:latin typeface=".SF NS"/>
+              </a:rPr>
+              <a:t>and</a:t>
+            </a:r>
+            <a:r>
+              <a:rPr lang="pt-PT" sz="1400" b="0" dirty="0">
+                <a:solidFill>
+                  <a:srgbClr val="0E0E0E"/>
+                </a:solidFill>
+                <a:effectLst/>
+                <a:latin typeface=".SF NS"/>
+              </a:rPr>
+              <a:t> </a:t>
+            </a:r>
+            <a:r>
+              <a:rPr lang="pt-PT" sz="1400" b="0" dirty="0" err="1">
+                <a:solidFill>
+                  <a:srgbClr val="0E0E0E"/>
+                </a:solidFill>
+                <a:effectLst/>
+                <a:latin typeface=".SF NS"/>
+              </a:rPr>
+              <a:t>it’s</a:t>
+            </a:r>
+            <a:r>
+              <a:rPr lang="pt-PT" sz="1400" b="0" dirty="0">
+                <a:solidFill>
+                  <a:srgbClr val="0E0E0E"/>
+                </a:solidFill>
+                <a:effectLst/>
+                <a:latin typeface=".SF NS"/>
+              </a:rPr>
+              <a:t> </a:t>
+            </a:r>
+            <a:r>
+              <a:rPr lang="pt-PT" sz="1400" b="0" dirty="0" err="1">
+                <a:solidFill>
+                  <a:srgbClr val="0E0E0E"/>
+                </a:solidFill>
+                <a:effectLst/>
+                <a:latin typeface=".SF NS"/>
+              </a:rPr>
+              <a:t>important</a:t>
+            </a:r>
+            <a:r>
+              <a:rPr lang="pt-PT" sz="1400" b="0" dirty="0">
+                <a:solidFill>
+                  <a:srgbClr val="0E0E0E"/>
+                </a:solidFill>
+                <a:effectLst/>
+                <a:latin typeface=".SF NS"/>
+              </a:rPr>
+              <a:t> for </a:t>
+            </a:r>
+            <a:r>
+              <a:rPr lang="pt-PT" sz="1400" b="0" dirty="0" err="1">
+                <a:solidFill>
+                  <a:srgbClr val="0E0E0E"/>
+                </a:solidFill>
+                <a:effectLst/>
+                <a:latin typeface=".SF NS"/>
+              </a:rPr>
+              <a:t>the</a:t>
+            </a:r>
+            <a:r>
+              <a:rPr lang="pt-PT" sz="1400" b="0" dirty="0">
+                <a:solidFill>
+                  <a:srgbClr val="0E0E0E"/>
+                </a:solidFill>
+                <a:effectLst/>
+                <a:latin typeface=".SF NS"/>
+              </a:rPr>
+              <a:t> team to </a:t>
+            </a:r>
+            <a:r>
+              <a:rPr lang="pt-PT" sz="1400" b="0" dirty="0" err="1">
+                <a:solidFill>
+                  <a:srgbClr val="0E0E0E"/>
+                </a:solidFill>
+                <a:effectLst/>
+                <a:latin typeface=".SF NS"/>
+              </a:rPr>
+              <a:t>ensure</a:t>
+            </a:r>
+            <a:r>
+              <a:rPr lang="pt-PT" sz="1400" b="0" dirty="0">
+                <a:solidFill>
+                  <a:srgbClr val="0E0E0E"/>
+                </a:solidFill>
+                <a:effectLst/>
+                <a:latin typeface=".SF NS"/>
+              </a:rPr>
+              <a:t> </a:t>
+            </a:r>
+            <a:r>
+              <a:rPr lang="pt-PT" sz="1400" b="0" dirty="0" err="1">
+                <a:solidFill>
+                  <a:srgbClr val="0E0E0E"/>
+                </a:solidFill>
+                <a:effectLst/>
+                <a:latin typeface=".SF NS"/>
+              </a:rPr>
+              <a:t>that</a:t>
+            </a:r>
+            <a:r>
+              <a:rPr lang="pt-PT" sz="1400" b="0" dirty="0">
+                <a:solidFill>
+                  <a:srgbClr val="0E0E0E"/>
+                </a:solidFill>
+                <a:effectLst/>
+                <a:latin typeface=".SF NS"/>
+              </a:rPr>
+              <a:t> </a:t>
+            </a:r>
+            <a:r>
+              <a:rPr lang="pt-PT" sz="1400" b="0" dirty="0" err="1">
+                <a:solidFill>
+                  <a:srgbClr val="0E0E0E"/>
+                </a:solidFill>
+                <a:effectLst/>
+                <a:latin typeface=".SF NS"/>
+              </a:rPr>
+              <a:t>his</a:t>
+            </a:r>
+            <a:r>
+              <a:rPr lang="pt-PT" sz="1400" b="0" dirty="0">
+                <a:solidFill>
+                  <a:srgbClr val="0E0E0E"/>
+                </a:solidFill>
+                <a:effectLst/>
+                <a:latin typeface=".SF NS"/>
+              </a:rPr>
+              <a:t> </a:t>
+            </a:r>
+            <a:r>
+              <a:rPr lang="pt-PT" sz="1400" b="0" dirty="0" err="1">
+                <a:solidFill>
+                  <a:srgbClr val="0E0E0E"/>
+                </a:solidFill>
+                <a:effectLst/>
+                <a:latin typeface=".SF NS"/>
+              </a:rPr>
+              <a:t>workload</a:t>
+            </a:r>
+            <a:r>
+              <a:rPr lang="pt-PT" sz="1400" b="0" dirty="0">
+                <a:solidFill>
+                  <a:srgbClr val="0E0E0E"/>
+                </a:solidFill>
+                <a:effectLst/>
+                <a:latin typeface=".SF NS"/>
+              </a:rPr>
+              <a:t> </a:t>
+            </a:r>
+            <a:r>
+              <a:rPr lang="pt-PT" sz="1400" b="0" dirty="0" err="1">
+                <a:solidFill>
+                  <a:srgbClr val="0E0E0E"/>
+                </a:solidFill>
+                <a:effectLst/>
+                <a:latin typeface=".SF NS"/>
+              </a:rPr>
+              <a:t>remains</a:t>
+            </a:r>
+            <a:r>
+              <a:rPr lang="pt-PT" sz="1400" b="0" dirty="0">
+                <a:solidFill>
+                  <a:srgbClr val="0E0E0E"/>
+                </a:solidFill>
+                <a:effectLst/>
+                <a:latin typeface=".SF NS"/>
+              </a:rPr>
+              <a:t> </a:t>
+            </a:r>
+            <a:r>
+              <a:rPr lang="pt-PT" sz="1400" b="0" dirty="0" err="1">
+                <a:solidFill>
+                  <a:srgbClr val="0E0E0E"/>
+                </a:solidFill>
+                <a:effectLst/>
+                <a:latin typeface=".SF NS"/>
+              </a:rPr>
+              <a:t>manageable</a:t>
+            </a:r>
+            <a:r>
+              <a:rPr lang="pt-PT" sz="1400" b="0" dirty="0">
+                <a:solidFill>
+                  <a:srgbClr val="0E0E0E"/>
+                </a:solidFill>
+                <a:effectLst/>
+                <a:latin typeface=".SF NS"/>
+              </a:rPr>
+              <a:t> to </a:t>
+            </a:r>
+            <a:r>
+              <a:rPr lang="pt-PT" sz="1400" b="0" dirty="0" err="1">
+                <a:solidFill>
+                  <a:srgbClr val="0E0E0E"/>
+                </a:solidFill>
+                <a:effectLst/>
+                <a:latin typeface=".SF NS"/>
+              </a:rPr>
+              <a:t>maintain</a:t>
+            </a:r>
+            <a:r>
+              <a:rPr lang="pt-PT" sz="1400" b="0" dirty="0">
+                <a:solidFill>
+                  <a:srgbClr val="0E0E0E"/>
+                </a:solidFill>
+                <a:effectLst/>
+                <a:latin typeface=".SF NS"/>
+              </a:rPr>
+              <a:t> </a:t>
+            </a:r>
+            <a:r>
+              <a:rPr lang="pt-PT" sz="1400" b="0" dirty="0" err="1">
+                <a:solidFill>
+                  <a:srgbClr val="0E0E0E"/>
+                </a:solidFill>
+                <a:effectLst/>
+                <a:latin typeface=".SF NS"/>
+              </a:rPr>
+              <a:t>his</a:t>
+            </a:r>
+            <a:r>
+              <a:rPr lang="pt-PT" sz="1400" b="0" dirty="0">
+                <a:solidFill>
+                  <a:srgbClr val="0E0E0E"/>
+                </a:solidFill>
+                <a:effectLst/>
+                <a:latin typeface=".SF NS"/>
+              </a:rPr>
+              <a:t> </a:t>
+            </a:r>
+            <a:r>
+              <a:rPr lang="pt-PT" sz="1400" b="0" dirty="0" err="1">
+                <a:solidFill>
+                  <a:srgbClr val="0E0E0E"/>
+                </a:solidFill>
+                <a:effectLst/>
+                <a:latin typeface=".SF NS"/>
+              </a:rPr>
+              <a:t>well-being</a:t>
+            </a:r>
+            <a:r>
+              <a:rPr lang="pt-PT" sz="1400" b="0" dirty="0">
+                <a:solidFill>
+                  <a:srgbClr val="0E0E0E"/>
+                </a:solidFill>
+                <a:effectLst/>
+                <a:latin typeface=".SF NS"/>
+              </a:rPr>
+              <a:t>.</a:t>
             </a:r>
           </a:p>
           <a:p>
-            <a:pPr algn="just"/>
-            <a:r>
-              <a:rPr lang="en-US" sz="1400" b="0" dirty="0">
-                <a:solidFill>
-                  <a:schemeClr val="tx1"/>
-                </a:solidFill>
-              </a:rPr>
-              <a:t>It might be helpful to rebalance the workload slightly so that everyone is contributing more evenly. The key here would be better task distribution and possibly some check-ins to see if people like Paulo and Romeu need extra support or motivation to pick up the pace. Overall, the team is working, but a few adjustments could make things more efficient and less stressful for everyone, especially Jorge.</a:t>
-            </a:r>
+            <a:r>
+              <a:rPr lang="pt-PT" sz="1400" b="0" dirty="0" err="1">
+                <a:solidFill>
+                  <a:srgbClr val="0E0E0E"/>
+                </a:solidFill>
+                <a:effectLst/>
+                <a:latin typeface=".SF NS"/>
+              </a:rPr>
+              <a:t>Francisco’s</a:t>
+            </a:r>
+            <a:r>
+              <a:rPr lang="pt-PT" sz="1400" b="0" dirty="0">
+                <a:solidFill>
+                  <a:srgbClr val="0E0E0E"/>
+                </a:solidFill>
+                <a:effectLst/>
+                <a:latin typeface=".SF NS"/>
+              </a:rPr>
+              <a:t> </a:t>
+            </a:r>
+            <a:r>
+              <a:rPr lang="pt-PT" sz="1400" b="0" dirty="0" err="1">
+                <a:solidFill>
+                  <a:srgbClr val="0E0E0E"/>
+                </a:solidFill>
+                <a:effectLst/>
+                <a:latin typeface=".SF NS"/>
+              </a:rPr>
+              <a:t>contribution</a:t>
+            </a:r>
+            <a:r>
+              <a:rPr lang="pt-PT" sz="1400" b="0" dirty="0">
+                <a:solidFill>
+                  <a:srgbClr val="0E0E0E"/>
+                </a:solidFill>
+                <a:effectLst/>
+                <a:latin typeface=".SF NS"/>
+              </a:rPr>
+              <a:t> </a:t>
+            </a:r>
+            <a:r>
+              <a:rPr lang="pt-PT" sz="1400" b="0" dirty="0" err="1">
+                <a:solidFill>
+                  <a:srgbClr val="0E0E0E"/>
+                </a:solidFill>
+                <a:effectLst/>
+                <a:latin typeface=".SF NS"/>
+              </a:rPr>
+              <a:t>of</a:t>
+            </a:r>
+            <a:r>
+              <a:rPr lang="pt-PT" sz="1400" b="0" dirty="0">
+                <a:solidFill>
+                  <a:srgbClr val="0E0E0E"/>
+                </a:solidFill>
+                <a:effectLst/>
+                <a:latin typeface=".SF NS"/>
+              </a:rPr>
+              <a:t> </a:t>
+            </a:r>
+            <a:r>
+              <a:rPr lang="pt-PT" sz="1400" b="0" dirty="0" err="1">
+                <a:solidFill>
+                  <a:srgbClr val="0E0E0E"/>
+                </a:solidFill>
+                <a:effectLst/>
+                <a:latin typeface=".SF NS"/>
+              </a:rPr>
+              <a:t>about</a:t>
+            </a:r>
+            <a:r>
+              <a:rPr lang="pt-PT" sz="1400" b="0" dirty="0">
+                <a:solidFill>
+                  <a:srgbClr val="0E0E0E"/>
+                </a:solidFill>
+                <a:effectLst/>
+                <a:latin typeface=".SF NS"/>
+              </a:rPr>
+              <a:t> 41 </a:t>
+            </a:r>
+            <a:r>
+              <a:rPr lang="pt-PT" sz="1400" b="0" dirty="0" err="1">
+                <a:solidFill>
+                  <a:srgbClr val="0E0E0E"/>
+                </a:solidFill>
+                <a:effectLst/>
+                <a:latin typeface=".SF NS"/>
+              </a:rPr>
+              <a:t>hours</a:t>
+            </a:r>
+            <a:r>
+              <a:rPr lang="pt-PT" sz="1400" b="0" dirty="0">
+                <a:solidFill>
+                  <a:srgbClr val="0E0E0E"/>
+                </a:solidFill>
+                <a:effectLst/>
+                <a:latin typeface=".SF NS"/>
+              </a:rPr>
+              <a:t> </a:t>
+            </a:r>
+            <a:r>
+              <a:rPr lang="pt-PT" sz="1400" b="0" dirty="0" err="1">
+                <a:solidFill>
+                  <a:srgbClr val="0E0E0E"/>
+                </a:solidFill>
+                <a:effectLst/>
+                <a:latin typeface=".SF NS"/>
+              </a:rPr>
+              <a:t>demonstrates</a:t>
+            </a:r>
+            <a:r>
+              <a:rPr lang="pt-PT" sz="1400" b="0" dirty="0">
+                <a:solidFill>
+                  <a:srgbClr val="0E0E0E"/>
+                </a:solidFill>
+                <a:effectLst/>
+                <a:latin typeface=".SF NS"/>
+              </a:rPr>
+              <a:t> a </a:t>
+            </a:r>
+            <a:r>
+              <a:rPr lang="pt-PT" sz="1400" b="0" dirty="0" err="1">
+                <a:solidFill>
+                  <a:srgbClr val="0E0E0E"/>
+                </a:solidFill>
+                <a:effectLst/>
+                <a:latin typeface=".SF NS"/>
+              </a:rPr>
+              <a:t>solid</a:t>
+            </a:r>
+            <a:r>
+              <a:rPr lang="pt-PT" sz="1400" b="0" dirty="0">
+                <a:solidFill>
+                  <a:srgbClr val="0E0E0E"/>
+                </a:solidFill>
+                <a:effectLst/>
+                <a:latin typeface=".SF NS"/>
+              </a:rPr>
+              <a:t> </a:t>
+            </a:r>
+            <a:r>
+              <a:rPr lang="pt-PT" sz="1400" b="0" dirty="0" err="1">
+                <a:solidFill>
+                  <a:srgbClr val="0E0E0E"/>
+                </a:solidFill>
+                <a:effectLst/>
+                <a:latin typeface=".SF NS"/>
+              </a:rPr>
+              <a:t>work</a:t>
+            </a:r>
+            <a:r>
+              <a:rPr lang="pt-PT" sz="1400" b="0" dirty="0">
+                <a:solidFill>
+                  <a:srgbClr val="0E0E0E"/>
+                </a:solidFill>
+                <a:effectLst/>
+                <a:latin typeface=".SF NS"/>
+              </a:rPr>
+              <a:t> </a:t>
+            </a:r>
+            <a:r>
+              <a:rPr lang="pt-PT" sz="1400" b="0" dirty="0" err="1">
+                <a:solidFill>
+                  <a:srgbClr val="0E0E0E"/>
+                </a:solidFill>
+                <a:effectLst/>
+                <a:latin typeface=".SF NS"/>
+              </a:rPr>
+              <a:t>ethic</a:t>
+            </a:r>
+            <a:r>
+              <a:rPr lang="pt-PT" sz="1400" b="0" dirty="0">
+                <a:solidFill>
+                  <a:srgbClr val="0E0E0E"/>
+                </a:solidFill>
+                <a:effectLst/>
+                <a:latin typeface=".SF NS"/>
+              </a:rPr>
+              <a:t>, </a:t>
+            </a:r>
+            <a:r>
+              <a:rPr lang="pt-PT" sz="1400" b="0" dirty="0" err="1">
+                <a:solidFill>
+                  <a:srgbClr val="0E0E0E"/>
+                </a:solidFill>
+                <a:effectLst/>
+                <a:latin typeface=".SF NS"/>
+              </a:rPr>
+              <a:t>positioning</a:t>
+            </a:r>
+            <a:r>
+              <a:rPr lang="pt-PT" sz="1400" b="0" dirty="0">
+                <a:solidFill>
+                  <a:srgbClr val="0E0E0E"/>
+                </a:solidFill>
+                <a:effectLst/>
+                <a:latin typeface=".SF NS"/>
+              </a:rPr>
+              <a:t> </a:t>
+            </a:r>
+            <a:r>
+              <a:rPr lang="pt-PT" sz="1400" b="0" dirty="0" err="1">
+                <a:solidFill>
+                  <a:srgbClr val="0E0E0E"/>
+                </a:solidFill>
+                <a:effectLst/>
+                <a:latin typeface=".SF NS"/>
+              </a:rPr>
+              <a:t>him</a:t>
+            </a:r>
+            <a:r>
+              <a:rPr lang="pt-PT" sz="1400" b="0" dirty="0">
+                <a:solidFill>
+                  <a:srgbClr val="0E0E0E"/>
+                </a:solidFill>
+                <a:effectLst/>
+                <a:latin typeface=".SF NS"/>
+              </a:rPr>
+              <a:t> as a </a:t>
+            </a:r>
+            <a:r>
+              <a:rPr lang="pt-PT" sz="1400" b="0" dirty="0" err="1">
+                <a:solidFill>
+                  <a:srgbClr val="0E0E0E"/>
+                </a:solidFill>
+                <a:effectLst/>
+                <a:latin typeface=".SF NS"/>
+              </a:rPr>
+              <a:t>key</a:t>
+            </a:r>
+            <a:r>
+              <a:rPr lang="pt-PT" sz="1400" b="0" dirty="0">
+                <a:solidFill>
+                  <a:srgbClr val="0E0E0E"/>
+                </a:solidFill>
+                <a:effectLst/>
+                <a:latin typeface=".SF NS"/>
+              </a:rPr>
+              <a:t> </a:t>
+            </a:r>
+            <a:r>
+              <a:rPr lang="pt-PT" sz="1400" b="0" dirty="0" err="1">
+                <a:solidFill>
+                  <a:srgbClr val="0E0E0E"/>
+                </a:solidFill>
+                <a:effectLst/>
+                <a:latin typeface=".SF NS"/>
+              </a:rPr>
+              <a:t>contributor</a:t>
+            </a:r>
+            <a:r>
+              <a:rPr lang="pt-PT" sz="1400" b="0" dirty="0">
+                <a:solidFill>
+                  <a:srgbClr val="0E0E0E"/>
+                </a:solidFill>
+                <a:effectLst/>
+                <a:latin typeface=".SF NS"/>
+              </a:rPr>
+              <a:t> </a:t>
+            </a:r>
+            <a:r>
+              <a:rPr lang="pt-PT" sz="1400" b="0" dirty="0" err="1">
+                <a:solidFill>
+                  <a:srgbClr val="0E0E0E"/>
+                </a:solidFill>
+                <a:effectLst/>
+                <a:latin typeface=".SF NS"/>
+              </a:rPr>
+              <a:t>alongside</a:t>
+            </a:r>
+            <a:r>
+              <a:rPr lang="pt-PT" sz="1400" b="0" dirty="0">
+                <a:solidFill>
+                  <a:srgbClr val="0E0E0E"/>
+                </a:solidFill>
+                <a:effectLst/>
+                <a:latin typeface=".SF NS"/>
+              </a:rPr>
+              <a:t> Jorge. </a:t>
+            </a:r>
+            <a:r>
+              <a:rPr lang="pt-PT" sz="1400" b="0" dirty="0" err="1">
+                <a:solidFill>
+                  <a:srgbClr val="0E0E0E"/>
+                </a:solidFill>
+                <a:effectLst/>
+                <a:latin typeface=".SF NS"/>
+              </a:rPr>
+              <a:t>Emanuel’s</a:t>
+            </a:r>
+            <a:r>
+              <a:rPr lang="pt-PT" sz="1400" b="0" dirty="0">
+                <a:solidFill>
+                  <a:srgbClr val="0E0E0E"/>
+                </a:solidFill>
+                <a:effectLst/>
+                <a:latin typeface=".SF NS"/>
+              </a:rPr>
+              <a:t> input </a:t>
+            </a:r>
+            <a:r>
+              <a:rPr lang="pt-PT" sz="1400" b="0" dirty="0" err="1">
+                <a:solidFill>
+                  <a:srgbClr val="0E0E0E"/>
+                </a:solidFill>
+                <a:effectLst/>
+                <a:latin typeface=".SF NS"/>
+              </a:rPr>
+              <a:t>of</a:t>
+            </a:r>
+            <a:r>
+              <a:rPr lang="pt-PT" sz="1400" b="0" dirty="0">
+                <a:solidFill>
+                  <a:srgbClr val="0E0E0E"/>
+                </a:solidFill>
+                <a:effectLst/>
+                <a:latin typeface=".SF NS"/>
+              </a:rPr>
+              <a:t> </a:t>
+            </a:r>
+            <a:r>
+              <a:rPr lang="pt-PT" sz="1400" b="0" dirty="0" err="1">
+                <a:solidFill>
+                  <a:srgbClr val="0E0E0E"/>
+                </a:solidFill>
+                <a:effectLst/>
+                <a:latin typeface=".SF NS"/>
+              </a:rPr>
+              <a:t>around</a:t>
+            </a:r>
+            <a:r>
+              <a:rPr lang="pt-PT" sz="1400" b="0" dirty="0">
+                <a:solidFill>
+                  <a:srgbClr val="0E0E0E"/>
+                </a:solidFill>
+                <a:effectLst/>
+                <a:latin typeface=".SF NS"/>
+              </a:rPr>
+              <a:t> 30 </a:t>
+            </a:r>
+            <a:r>
+              <a:rPr lang="pt-PT" sz="1400" b="0" dirty="0" err="1">
+                <a:solidFill>
+                  <a:srgbClr val="0E0E0E"/>
+                </a:solidFill>
+                <a:effectLst/>
+                <a:latin typeface=".SF NS"/>
+              </a:rPr>
+              <a:t>hours</a:t>
+            </a:r>
+            <a:r>
+              <a:rPr lang="pt-PT" sz="1400" b="0" dirty="0">
+                <a:solidFill>
+                  <a:srgbClr val="0E0E0E"/>
+                </a:solidFill>
+                <a:effectLst/>
+                <a:latin typeface=".SF NS"/>
+              </a:rPr>
+              <a:t> </a:t>
+            </a:r>
+            <a:r>
+              <a:rPr lang="pt-PT" sz="1400" b="0" dirty="0" err="1">
+                <a:solidFill>
+                  <a:srgbClr val="0E0E0E"/>
+                </a:solidFill>
+                <a:effectLst/>
+                <a:latin typeface=".SF NS"/>
+              </a:rPr>
+              <a:t>is</a:t>
+            </a:r>
+            <a:r>
+              <a:rPr lang="pt-PT" sz="1400" b="0" dirty="0">
+                <a:solidFill>
+                  <a:srgbClr val="0E0E0E"/>
+                </a:solidFill>
+                <a:effectLst/>
+                <a:latin typeface=".SF NS"/>
+              </a:rPr>
+              <a:t> </a:t>
+            </a:r>
+            <a:r>
+              <a:rPr lang="pt-PT" sz="1400" b="0" dirty="0" err="1">
+                <a:solidFill>
+                  <a:srgbClr val="0E0E0E"/>
+                </a:solidFill>
+                <a:effectLst/>
+                <a:latin typeface=".SF NS"/>
+              </a:rPr>
+              <a:t>also</a:t>
+            </a:r>
+            <a:r>
+              <a:rPr lang="pt-PT" sz="1400" b="0" dirty="0">
+                <a:solidFill>
+                  <a:srgbClr val="0E0E0E"/>
+                </a:solidFill>
+                <a:effectLst/>
+                <a:latin typeface=".SF NS"/>
+              </a:rPr>
+              <a:t> </a:t>
+            </a:r>
+            <a:r>
+              <a:rPr lang="pt-PT" sz="1400" b="0" dirty="0" err="1">
+                <a:solidFill>
+                  <a:srgbClr val="0E0E0E"/>
+                </a:solidFill>
+                <a:effectLst/>
+                <a:latin typeface=".SF NS"/>
+              </a:rPr>
+              <a:t>noteworthy</a:t>
+            </a:r>
+            <a:r>
+              <a:rPr lang="pt-PT" sz="1400" b="0" dirty="0">
+                <a:solidFill>
+                  <a:srgbClr val="0E0E0E"/>
+                </a:solidFill>
+                <a:effectLst/>
+                <a:latin typeface=".SF NS"/>
+              </a:rPr>
+              <a:t> </a:t>
+            </a:r>
+            <a:r>
+              <a:rPr lang="pt-PT" sz="1400" b="0" dirty="0" err="1">
+                <a:solidFill>
+                  <a:srgbClr val="0E0E0E"/>
+                </a:solidFill>
+                <a:effectLst/>
+                <a:latin typeface=".SF NS"/>
+              </a:rPr>
+              <a:t>and</a:t>
+            </a:r>
+            <a:r>
+              <a:rPr lang="pt-PT" sz="1400" b="0" dirty="0">
+                <a:solidFill>
+                  <a:srgbClr val="0E0E0E"/>
+                </a:solidFill>
+                <a:effectLst/>
+                <a:latin typeface=".SF NS"/>
+              </a:rPr>
+              <a:t> </a:t>
+            </a:r>
+            <a:r>
+              <a:rPr lang="pt-PT" sz="1400" b="0" dirty="0" err="1">
+                <a:solidFill>
+                  <a:srgbClr val="0E0E0E"/>
+                </a:solidFill>
+                <a:effectLst/>
+                <a:latin typeface=".SF NS"/>
+              </a:rPr>
+              <a:t>indicates</a:t>
+            </a:r>
+            <a:r>
+              <a:rPr lang="pt-PT" sz="1400" b="0" dirty="0">
+                <a:solidFill>
+                  <a:srgbClr val="0E0E0E"/>
+                </a:solidFill>
+                <a:effectLst/>
+                <a:latin typeface=".SF NS"/>
+              </a:rPr>
+              <a:t> </a:t>
+            </a:r>
+            <a:r>
+              <a:rPr lang="pt-PT" sz="1400" b="0" dirty="0" err="1">
+                <a:solidFill>
+                  <a:srgbClr val="0E0E0E"/>
+                </a:solidFill>
+                <a:effectLst/>
+                <a:latin typeface=".SF NS"/>
+              </a:rPr>
+              <a:t>that</a:t>
+            </a:r>
+            <a:r>
+              <a:rPr lang="pt-PT" sz="1400" b="0" dirty="0">
+                <a:solidFill>
+                  <a:srgbClr val="0E0E0E"/>
+                </a:solidFill>
+                <a:effectLst/>
+                <a:latin typeface=".SF NS"/>
+              </a:rPr>
+              <a:t> </a:t>
+            </a:r>
+            <a:r>
+              <a:rPr lang="pt-PT" sz="1400" b="0" dirty="0" err="1">
+                <a:solidFill>
+                  <a:srgbClr val="0E0E0E"/>
+                </a:solidFill>
+                <a:effectLst/>
+                <a:latin typeface=".SF NS"/>
+              </a:rPr>
+              <a:t>he</a:t>
+            </a:r>
+            <a:r>
+              <a:rPr lang="pt-PT" sz="1400" b="0" dirty="0">
+                <a:solidFill>
+                  <a:srgbClr val="0E0E0E"/>
+                </a:solidFill>
+                <a:effectLst/>
+                <a:latin typeface=".SF NS"/>
+              </a:rPr>
+              <a:t> </a:t>
+            </a:r>
+            <a:r>
+              <a:rPr lang="pt-PT" sz="1400" b="0" dirty="0" err="1">
+                <a:solidFill>
+                  <a:srgbClr val="0E0E0E"/>
+                </a:solidFill>
+                <a:effectLst/>
+                <a:latin typeface=".SF NS"/>
+              </a:rPr>
+              <a:t>is</a:t>
+            </a:r>
+            <a:r>
+              <a:rPr lang="pt-PT" sz="1400" b="0" dirty="0">
+                <a:solidFill>
+                  <a:srgbClr val="0E0E0E"/>
+                </a:solidFill>
+                <a:effectLst/>
+                <a:latin typeface=".SF NS"/>
+              </a:rPr>
+              <a:t> </a:t>
+            </a:r>
+            <a:r>
+              <a:rPr lang="pt-PT" sz="1400" b="0" dirty="0" err="1">
+                <a:solidFill>
+                  <a:srgbClr val="0E0E0E"/>
+                </a:solidFill>
+                <a:effectLst/>
+                <a:latin typeface=".SF NS"/>
+              </a:rPr>
+              <a:t>actively</a:t>
+            </a:r>
+            <a:r>
+              <a:rPr lang="pt-PT" sz="1400" b="0" dirty="0">
+                <a:solidFill>
+                  <a:srgbClr val="0E0E0E"/>
+                </a:solidFill>
+                <a:effectLst/>
+                <a:latin typeface=".SF NS"/>
+              </a:rPr>
+              <a:t> </a:t>
+            </a:r>
+            <a:r>
+              <a:rPr lang="pt-PT" sz="1400" b="0" dirty="0" err="1">
+                <a:solidFill>
+                  <a:srgbClr val="0E0E0E"/>
+                </a:solidFill>
+                <a:effectLst/>
+                <a:latin typeface=".SF NS"/>
+              </a:rPr>
+              <a:t>engaged</a:t>
+            </a:r>
+            <a:r>
+              <a:rPr lang="pt-PT" sz="1400" b="0" dirty="0">
+                <a:solidFill>
+                  <a:srgbClr val="0E0E0E"/>
+                </a:solidFill>
+                <a:effectLst/>
+                <a:latin typeface=".SF NS"/>
+              </a:rPr>
+              <a:t> in </a:t>
+            </a:r>
+            <a:r>
+              <a:rPr lang="pt-PT" sz="1400" b="0" dirty="0" err="1">
+                <a:solidFill>
+                  <a:srgbClr val="0E0E0E"/>
+                </a:solidFill>
+                <a:effectLst/>
+                <a:latin typeface=".SF NS"/>
+              </a:rPr>
+              <a:t>supporting</a:t>
+            </a:r>
+            <a:r>
+              <a:rPr lang="pt-PT" sz="1400" b="0" dirty="0">
+                <a:solidFill>
+                  <a:srgbClr val="0E0E0E"/>
+                </a:solidFill>
+                <a:effectLst/>
+                <a:latin typeface=".SF NS"/>
+              </a:rPr>
+              <a:t> team </a:t>
+            </a:r>
+            <a:r>
+              <a:rPr lang="pt-PT" sz="1400" b="0" dirty="0" err="1">
+                <a:solidFill>
+                  <a:srgbClr val="0E0E0E"/>
+                </a:solidFill>
+                <a:effectLst/>
+                <a:latin typeface=".SF NS"/>
+              </a:rPr>
+              <a:t>objectives</a:t>
+            </a:r>
+            <a:r>
+              <a:rPr lang="pt-PT" sz="1400" b="0" dirty="0">
+                <a:solidFill>
+                  <a:srgbClr val="0E0E0E"/>
+                </a:solidFill>
+                <a:effectLst/>
+                <a:latin typeface=".SF NS"/>
+              </a:rPr>
+              <a:t>.</a:t>
+            </a:r>
+          </a:p>
+          <a:p>
+            <a:r>
+              <a:rPr lang="pt-PT" sz="1400" b="0" dirty="0" err="1">
+                <a:solidFill>
+                  <a:srgbClr val="0E0E0E"/>
+                </a:solidFill>
+                <a:effectLst/>
+                <a:latin typeface=".SF NS"/>
+              </a:rPr>
+              <a:t>While</a:t>
+            </a:r>
+            <a:r>
+              <a:rPr lang="pt-PT" sz="1400" b="0" dirty="0">
+                <a:solidFill>
+                  <a:srgbClr val="0E0E0E"/>
+                </a:solidFill>
+                <a:effectLst/>
+                <a:latin typeface=".SF NS"/>
+              </a:rPr>
+              <a:t> Romeu </a:t>
+            </a:r>
+            <a:r>
+              <a:rPr lang="pt-PT" sz="1400" b="0" dirty="0" err="1">
+                <a:solidFill>
+                  <a:srgbClr val="0E0E0E"/>
+                </a:solidFill>
+                <a:effectLst/>
+                <a:latin typeface=".SF NS"/>
+              </a:rPr>
+              <a:t>and</a:t>
+            </a:r>
+            <a:r>
+              <a:rPr lang="pt-PT" sz="1400" b="0" dirty="0">
+                <a:solidFill>
+                  <a:srgbClr val="0E0E0E"/>
+                </a:solidFill>
+                <a:effectLst/>
+                <a:latin typeface=".SF NS"/>
+              </a:rPr>
+              <a:t> Paulo </a:t>
+            </a:r>
+            <a:r>
+              <a:rPr lang="pt-PT" sz="1400" b="0" dirty="0" err="1">
+                <a:solidFill>
+                  <a:srgbClr val="0E0E0E"/>
+                </a:solidFill>
+                <a:effectLst/>
+                <a:latin typeface=".SF NS"/>
+              </a:rPr>
+              <a:t>have</a:t>
+            </a:r>
+            <a:r>
+              <a:rPr lang="pt-PT" sz="1400" b="0" dirty="0">
+                <a:solidFill>
+                  <a:srgbClr val="0E0E0E"/>
+                </a:solidFill>
+                <a:effectLst/>
+                <a:latin typeface=".SF NS"/>
+              </a:rPr>
+              <a:t> </a:t>
+            </a:r>
+            <a:r>
+              <a:rPr lang="pt-PT" sz="1400" b="0" dirty="0" err="1">
+                <a:solidFill>
+                  <a:srgbClr val="0E0E0E"/>
+                </a:solidFill>
+                <a:effectLst/>
+                <a:latin typeface=".SF NS"/>
+              </a:rPr>
+              <a:t>lower</a:t>
+            </a:r>
+            <a:r>
+              <a:rPr lang="pt-PT" sz="1400" b="0" dirty="0">
+                <a:solidFill>
+                  <a:srgbClr val="0E0E0E"/>
+                </a:solidFill>
+                <a:effectLst/>
+                <a:latin typeface=".SF NS"/>
+              </a:rPr>
+              <a:t> </a:t>
+            </a:r>
+            <a:r>
+              <a:rPr lang="pt-PT" sz="1400" b="0" dirty="0" err="1">
+                <a:solidFill>
+                  <a:srgbClr val="0E0E0E"/>
+                </a:solidFill>
+                <a:effectLst/>
+                <a:latin typeface=".SF NS"/>
+              </a:rPr>
+              <a:t>contributions</a:t>
+            </a:r>
+            <a:r>
+              <a:rPr lang="pt-PT" sz="1400" b="0" dirty="0">
+                <a:solidFill>
+                  <a:srgbClr val="0E0E0E"/>
+                </a:solidFill>
+                <a:effectLst/>
+                <a:latin typeface=".SF NS"/>
+              </a:rPr>
+              <a:t>, </a:t>
+            </a:r>
+            <a:r>
+              <a:rPr lang="pt-PT" sz="1400" b="0" dirty="0" err="1">
+                <a:solidFill>
+                  <a:srgbClr val="0E0E0E"/>
+                </a:solidFill>
+                <a:effectLst/>
+                <a:latin typeface=".SF NS"/>
+              </a:rPr>
+              <a:t>with</a:t>
+            </a:r>
+            <a:r>
+              <a:rPr lang="pt-PT" sz="1400" b="0" dirty="0">
+                <a:solidFill>
+                  <a:srgbClr val="0E0E0E"/>
+                </a:solidFill>
+                <a:effectLst/>
+                <a:latin typeface=".SF NS"/>
+              </a:rPr>
+              <a:t> Romeu </a:t>
+            </a:r>
+            <a:r>
+              <a:rPr lang="pt-PT" sz="1400" b="0" dirty="0" err="1">
+                <a:solidFill>
+                  <a:srgbClr val="0E0E0E"/>
+                </a:solidFill>
+                <a:effectLst/>
+                <a:latin typeface=".SF NS"/>
+              </a:rPr>
+              <a:t>around</a:t>
+            </a:r>
+            <a:r>
+              <a:rPr lang="pt-PT" sz="1400" b="0" dirty="0">
+                <a:solidFill>
+                  <a:srgbClr val="0E0E0E"/>
+                </a:solidFill>
+                <a:effectLst/>
+                <a:latin typeface=".SF NS"/>
+              </a:rPr>
+              <a:t> 10 </a:t>
+            </a:r>
+            <a:r>
+              <a:rPr lang="pt-PT" sz="1400" b="0" dirty="0" err="1">
+                <a:solidFill>
+                  <a:srgbClr val="0E0E0E"/>
+                </a:solidFill>
+                <a:effectLst/>
+                <a:latin typeface=".SF NS"/>
+              </a:rPr>
+              <a:t>hours</a:t>
+            </a:r>
+            <a:r>
+              <a:rPr lang="pt-PT" sz="1400" b="0" dirty="0">
+                <a:solidFill>
+                  <a:srgbClr val="0E0E0E"/>
+                </a:solidFill>
+                <a:effectLst/>
+                <a:latin typeface=".SF NS"/>
+              </a:rPr>
+              <a:t> </a:t>
+            </a:r>
+            <a:r>
+              <a:rPr lang="pt-PT" sz="1400" b="0" dirty="0" err="1">
+                <a:solidFill>
+                  <a:srgbClr val="0E0E0E"/>
+                </a:solidFill>
+                <a:effectLst/>
+                <a:latin typeface=".SF NS"/>
+              </a:rPr>
+              <a:t>and</a:t>
+            </a:r>
+            <a:r>
+              <a:rPr lang="pt-PT" sz="1400" b="0" dirty="0">
+                <a:solidFill>
+                  <a:srgbClr val="0E0E0E"/>
+                </a:solidFill>
+                <a:effectLst/>
+                <a:latin typeface=".SF NS"/>
+              </a:rPr>
+              <a:t> Paulo </a:t>
+            </a:r>
+            <a:r>
+              <a:rPr lang="pt-PT" sz="1400" b="0" dirty="0" err="1">
+                <a:solidFill>
+                  <a:srgbClr val="0E0E0E"/>
+                </a:solidFill>
+                <a:effectLst/>
+                <a:latin typeface=".SF NS"/>
+              </a:rPr>
+              <a:t>below</a:t>
+            </a:r>
+            <a:r>
+              <a:rPr lang="pt-PT" sz="1400" b="0" dirty="0">
+                <a:solidFill>
+                  <a:srgbClr val="0E0E0E"/>
+                </a:solidFill>
+                <a:effectLst/>
+                <a:latin typeface=".SF NS"/>
+              </a:rPr>
+              <a:t> </a:t>
+            </a:r>
+            <a:r>
+              <a:rPr lang="pt-PT" sz="1400" b="0" dirty="0" err="1">
+                <a:solidFill>
+                  <a:srgbClr val="0E0E0E"/>
+                </a:solidFill>
+                <a:effectLst/>
+                <a:latin typeface=".SF NS"/>
+              </a:rPr>
+              <a:t>that</a:t>
+            </a:r>
+            <a:r>
+              <a:rPr lang="pt-PT" sz="1400" b="0" dirty="0">
+                <a:solidFill>
+                  <a:srgbClr val="0E0E0E"/>
+                </a:solidFill>
+                <a:latin typeface=".SF NS"/>
+              </a:rPr>
+              <a:t>.</a:t>
+            </a:r>
+            <a:endParaRPr lang="pt-PT" sz="1400" b="0" dirty="0">
+              <a:solidFill>
+                <a:srgbClr val="0E0E0E"/>
+              </a:solidFill>
+              <a:effectLst/>
+              <a:latin typeface=".SF NS"/>
+            </a:endParaRPr>
+          </a:p>
+          <a:p>
+            <a:endParaRPr lang="pt-PT" sz="1400" b="0" dirty="0">
+              <a:solidFill>
+                <a:srgbClr val="0E0E0E"/>
+              </a:solidFill>
+              <a:effectLst/>
+              <a:latin typeface=".SF NS"/>
+            </a:endParaRPr>
           </a:p>
           <a:p>
             <a:endParaRPr lang="en-US" sz="2000" b="0" kern="0" dirty="0">
@@ -22696,37 +24432,8 @@
                   <a:schemeClr val="tx1"/>
                 </a:solidFill>
               </a:rPr>
-              <a:t>Work </a:t>
-            </a:r>
-            <a:r>
-              <a:rPr lang="pt-PT" sz="3200" cap="none" dirty="0" err="1">
-                <a:solidFill>
-                  <a:schemeClr val="tx1"/>
-                </a:solidFill>
-              </a:rPr>
-              <a:t>by</a:t>
-            </a:r>
-            <a:r>
-              <a:rPr lang="pt-PT" sz="3200" cap="none" dirty="0">
-                <a:solidFill>
-                  <a:schemeClr val="tx1"/>
-                </a:solidFill>
-              </a:rPr>
-              <a:t> team </a:t>
-            </a:r>
-            <a:r>
-              <a:rPr lang="pt-PT" sz="3200" cap="none" dirty="0" err="1">
-                <a:solidFill>
-                  <a:schemeClr val="tx1"/>
-                </a:solidFill>
-              </a:rPr>
-              <a:t>member</a:t>
-            </a:r>
-            <a:endParaRPr lang="pt-PT" sz="3200" cap="none" dirty="0">
-              <a:solidFill>
-                <a:schemeClr val="tx1"/>
-              </a:solidFill>
-            </a:endParaRPr>
+              <a:t>Work by team member</a:t>
+            </a:r>
           </a:p>
         </p:txBody>
       </p:sp>
@@ -22743,7 +24450,7 @@
           <p:nvPr>
             <p:extLst>
               <p:ext uri="{D42A27DB-BD31-4B8C-83A1-F6EECF244321}">
-                <p14:modId xmlns:p14="http://schemas.microsoft.com/office/powerpoint/2010/main" val="2206364879"/>
+                <p14:modId xmlns:p14="http://schemas.microsoft.com/office/powerpoint/2010/main" val="1393204556"/>
               </p:ext>
             </p:extLst>
           </p:nvPr>
@@ -22818,23 +24525,7 @@
                   <a:schemeClr val="tx1"/>
                 </a:solidFill>
               </a:rPr>
-              <a:t>Work </a:t>
-            </a:r>
-            <a:r>
-              <a:rPr lang="pt-PT" sz="3200" cap="none" dirty="0" err="1">
-                <a:solidFill>
-                  <a:schemeClr val="tx1"/>
-                </a:solidFill>
-              </a:rPr>
-              <a:t>by</a:t>
-            </a:r>
-            <a:r>
-              <a:rPr lang="pt-PT" sz="3200" cap="none" dirty="0">
-                <a:solidFill>
-                  <a:schemeClr val="tx1"/>
-                </a:solidFill>
-              </a:rPr>
-              <a:t> </a:t>
+              <a:t>Work by </a:t>
             </a:r>
             <a:r>
               <a:rPr lang="pt-PT" sz="3200" cap="none" dirty="0" err="1">
@@ -29817,15 +31508,6 @@
 </file>
 
 <file path=customXml/item1.xml><?xml version="1.0" encoding="utf-8"?>
-<?mso-contentType ?>
-<FormTemplates xmlns="http://schemas.microsoft.com/sharepoint/v3/contenttype/forms">
-  <Display>DocumentLibraryForm</Display>
-  <Edit>DocumentLibraryForm</Edit>
-  <New>DocumentLibraryForm</New>
-</FormTemplates>
-</file>
-
-<file path=customXml/item2.xml><?xml version="1.0" encoding="utf-8"?>
 <ct:contentTypeSchema xmlns:ct="http://schemas.microsoft.com/office/2006/metadata/contentType" xmlns:ma="http://schemas.microsoft.com/office/2006/metadata/properties/metaAttributes" ct:_="" ma:_="" ma:contentTypeName="Document" ma:contentTypeID="0x0101005836243B3C47804EAF5FFDD9F066FCC7" ma:contentTypeVersion="2" ma:contentTypeDescription="Create a new document." ma:contentTypeScope="" ma:versionID="0469372245184f18195408053fbf9b6d">
   <xsd:schema xmlns:xsd="http://www.w3.org/2001/XMLSchema" xmlns:xs="http://www.w3.org/2001/XMLSchema" xmlns:p="http://schemas.microsoft.com/office/2006/metadata/properties" xmlns:ns2="a1e3ca88-8ae5-4fd0-ba37-40ce669fcbb0" targetNamespace="http://schemas.microsoft.com/office/2006/metadata/properties" ma:root="true" ma:fieldsID="15cd5fdf54d7c5df31b4840e959455b1" ns2:_="">
     <xsd:import namespace="a1e3ca88-8ae5-4fd0-ba37-40ce669fcbb0"/>
@@ -29957,6 +31639,15 @@
 </ct:contentTypeSchema>
 </file>
 
+<file path=customXml/item2.xml><?xml version="1.0" encoding="utf-8"?>
+<?mso-contentType ?>
+<FormTemplates xmlns="http://schemas.microsoft.com/sharepoint/v3/contenttype/forms">
+  <Display>DocumentLibraryForm</Display>
+  <Edit>DocumentLibraryForm</Edit>
+  <New>DocumentLibraryForm</New>
+</FormTemplates>
+</file>
+
 <file path=customXml/item3.xml><?xml version="1.0" encoding="utf-8"?>
 <p:properties xmlns:p="http://schemas.microsoft.com/office/2006/metadata/properties" xmlns:xsi="http://www.w3.org/2001/XMLSchema-instance" xmlns:pc="http://schemas.microsoft.com/office/infopath/2007/PartnerControls">
   <documentManagement/>
@@ -29964,14 +31655,6 @@
 </file>
 
 <file path=customXml/itemProps1.xml><?xml version="1.0" encoding="utf-8"?>
-<ds:datastoreItem xmlns:ds="http://schemas.openxmlformats.org/officeDocument/2006/customXml" ds:itemID="{4F984168-AABC-4753-B4EC-59CA9D08839F}">
-  <ds:schemaRefs>
-    <ds:schemaRef ds:uri="http://schemas.microsoft.com/sharepoint/v3/contenttype/forms"/>
-  </ds:schemaRefs>
-</ds:datastoreItem>
-</file>
-
-<file path=customXml/itemProps2.xml><?xml version="1.0" encoding="utf-8"?>
 <ds:datastoreItem xmlns:ds="http://schemas.openxmlformats.org/officeDocument/2006/customXml" ds:itemID="{2092E48C-C6FF-44AE-8C78-D9681B66D30B}">
   <ds:schemaRefs>
     <ds:schemaRef ds:uri="http://schemas.microsoft.com/office/2006/metadata/contentType"/>
@@ -29985,6 +31668,14 @@
     <ds:schemaRef ds:uri="http://purl.org/dc/elements/1.1/"/>
     <ds:schemaRef ds:uri="http://purl.org/dc/terms/"/>
     <ds:schemaRef ds:uri="http://schemas.microsoft.com/internal/obd"/>
+  </ds:schemaRefs>
+</ds:datastoreItem>
+</file>
+
+<file path=customXml/itemProps2.xml><?xml version="1.0" encoding="utf-8"?>
+<ds:datastoreItem xmlns:ds="http://schemas.openxmlformats.org/officeDocument/2006/customXml" ds:itemID="{4F984168-AABC-4753-B4EC-59CA9D08839F}">
+  <ds:schemaRefs>
+    <ds:schemaRef ds:uri="http://schemas.microsoft.com/sharepoint/v3/contenttype/forms"/>
   </ds:schemaRefs>
 </ds:datastoreItem>
 </file>

</xml_diff>